<commit_message>
fin pptx ___ finish
</commit_message>
<xml_diff>
--- a/答辩.pptx
+++ b/答辩.pptx
@@ -7524,7 +7524,7 @@
           <p:nvPr>
             <p:extLst>
               <p:ext uri="{D42A27DB-BD31-4B8C-83A1-F6EECF244321}">
-                <p14:modId xmlns:p14="http://schemas.microsoft.com/office/powerpoint/2010/main" val="188235929"/>
+                <p14:modId xmlns:p14="http://schemas.microsoft.com/office/powerpoint/2010/main" val="1015084031"/>
               </p:ext>
             </p:extLst>
           </p:nvPr>
@@ -7871,7 +7871,7 @@
                         <a:rPr lang="en-US" altLang="zh-CN" sz="1800" kern="100" dirty="0">
                           <a:effectLst/>
                         </a:rPr>
-                        <a:t>km</a:t>
+                        <a:t>m/s</a:t>
                       </a:r>
                       <a:endParaRPr lang="zh-CN" sz="1700" kern="100" dirty="0">
                         <a:effectLst/>
@@ -8008,7 +8008,7 @@
                         <a:rPr lang="en-US" altLang="zh-CN" sz="1800" kern="100" dirty="0">
                           <a:effectLst/>
                         </a:rPr>
-                        <a:t>km</a:t>
+                        <a:t>m/s</a:t>
                       </a:r>
                       <a:endParaRPr lang="zh-CN" sz="1700" kern="100" dirty="0">
                         <a:effectLst/>
@@ -8033,22 +8033,22 @@
                         </a:spcAft>
                       </a:pPr>
                       <a:r>
-                        <a:rPr lang="en-US" sz="2000" kern="100" dirty="0">
+                        <a:rPr lang="en-US" sz="2000" kern="100">
                           <a:effectLst/>
                         </a:rPr>
                         <a:t>6.58242*10</a:t>
                       </a:r>
                       <a:r>
-                        <a:rPr lang="en-US" altLang="zh-CN" sz="2000" kern="100" baseline="30000" dirty="0">
+                        <a:rPr lang="en-US" altLang="zh-CN" sz="2000" kern="100" baseline="30000">
                           <a:effectLst/>
                         </a:rPr>
                         <a:t>-5 </a:t>
                       </a:r>
                       <a:r>
-                        <a:rPr lang="en-US" sz="2000" kern="100" dirty="0">
+                        <a:rPr lang="en-US" sz="2000" kern="100">
                           <a:effectLst/>
                         </a:rPr>
-                        <a:t>km</a:t>
+                        <a:t>m/s</a:t>
                       </a:r>
                       <a:endParaRPr lang="zh-CN" sz="1700" kern="100" dirty="0">
                         <a:effectLst/>

</xml_diff>